<commit_message>
Add database design model
</commit_message>
<xml_diff>
--- a/Presentation.pptx
+++ b/Presentation.pptx
@@ -243,7 +243,7 @@
           <a:p>
             <a:fld id="{EC13577B-6902-467D-A26C-08A0DD5E4E03}" type="datetimeFigureOut">
               <a:rPr lang="en-US" smtClean="0"/>
-              <a:t>4/26/24</a:t>
+              <a:t>4/27/24</a:t>
             </a:fld>
             <a:endParaRPr lang="en-US"/>
           </a:p>
@@ -1477,7 +1477,7 @@
             <a:fld id="{8BEEBAAA-29B5-4AF5-BC5F-7E580C29002D}" type="datetimeFigureOut">
               <a:rPr lang="en-US" smtClean="0"/>
               <a:pPr/>
-              <a:t>4/26/24</a:t>
+              <a:t>4/27/24</a:t>
             </a:fld>
             <a:endParaRPr lang="en-US"/>
           </a:p>
@@ -2022,7 +2022,7 @@
             <a:fld id="{8BEEBAAA-29B5-4AF5-BC5F-7E580C29002D}" type="datetimeFigureOut">
               <a:rPr lang="en-US" smtClean="0"/>
               <a:pPr/>
-              <a:t>4/26/24</a:t>
+              <a:t>4/27/24</a:t>
             </a:fld>
             <a:endParaRPr lang="en-US" dirty="0"/>
           </a:p>
@@ -3385,275 +3385,15 @@
           </a:p>
         </p:txBody>
       </p:sp>
-      <p:sp>
-        <p:nvSpPr>
-          <p:cNvPr id="7" name="Content Placeholder 6"/>
-          <p:cNvSpPr>
-            <a:spLocks noGrp="1"/>
-          </p:cNvSpPr>
-          <p:nvPr>
-            <p:ph idx="1"/>
-          </p:nvPr>
-        </p:nvSpPr>
-        <p:spPr>
-          <a:xfrm>
-            <a:off x="838201" y="1825624"/>
-            <a:ext cx="7362773" cy="4672285"/>
-          </a:xfrm>
-        </p:spPr>
-        <p:txBody>
-          <a:bodyPr>
-            <a:normAutofit fontScale="92500" lnSpcReduction="20000"/>
-          </a:bodyPr>
-          <a:lstStyle/>
-          <a:p>
-            <a:r>
-              <a:rPr lang="en-US" dirty="0">
-                <a:latin typeface="Arial" panose="020B0604020202020204" pitchFamily="34" charset="0"/>
-                <a:cs typeface="Arial" panose="020B0604020202020204" pitchFamily="34" charset="0"/>
-              </a:rPr>
-              <a:t>The </a:t>
-            </a:r>
-            <a:r>
-              <a:rPr lang="en-US" b="1" dirty="0">
-                <a:latin typeface="Arial" panose="020B0604020202020204" pitchFamily="34" charset="0"/>
-                <a:cs typeface="Arial" panose="020B0604020202020204" pitchFamily="34" charset="0"/>
-              </a:rPr>
-              <a:t>Selection Pane </a:t>
-            </a:r>
-            <a:r>
-              <a:rPr lang="en-US" dirty="0">
-                <a:latin typeface="Arial" panose="020B0604020202020204" pitchFamily="34" charset="0"/>
-                <a:cs typeface="Arial" panose="020B0604020202020204" pitchFamily="34" charset="0"/>
-              </a:rPr>
-              <a:t>is a great tool to organize and manage the objects on a slide, such as images, shapes, and text boxes. The </a:t>
-            </a:r>
-            <a:r>
-              <a:rPr lang="en-US" b="1" dirty="0">
-                <a:latin typeface="Arial" panose="020B0604020202020204" pitchFamily="34" charset="0"/>
-                <a:cs typeface="Arial" panose="020B0604020202020204" pitchFamily="34" charset="0"/>
-              </a:rPr>
-              <a:t>Selection Pane </a:t>
-            </a:r>
-            <a:r>
-              <a:rPr lang="en-US" dirty="0">
-                <a:latin typeface="Arial" panose="020B0604020202020204" pitchFamily="34" charset="0"/>
-                <a:cs typeface="Arial" panose="020B0604020202020204" pitchFamily="34" charset="0"/>
-              </a:rPr>
-              <a:t>is a subscription-only feature. If you have an Office 365 subscription, you can try it yourself:</a:t>
-            </a:r>
-          </a:p>
-          <a:p>
-            <a:r>
-              <a:rPr lang="en-US" dirty="0">
-                <a:latin typeface="Arial" panose="020B0604020202020204" pitchFamily="34" charset="0"/>
-                <a:cs typeface="Arial" panose="020B0604020202020204" pitchFamily="34" charset="0"/>
-              </a:rPr>
-              <a:t>Try it:</a:t>
-            </a:r>
-          </a:p>
-          <a:p>
-            <a:pPr marL="342900" indent="-342900">
-              <a:buFont typeface="+mj-lt"/>
-              <a:buAutoNum type="arabicPeriod"/>
-            </a:pPr>
-            <a:r>
-              <a:rPr lang="en-US" dirty="0">
-                <a:latin typeface="Arial" panose="020B0604020202020204" pitchFamily="34" charset="0"/>
-                <a:cs typeface="Arial" panose="020B0604020202020204" pitchFamily="34" charset="0"/>
-              </a:rPr>
-              <a:t>Go to the </a:t>
-            </a:r>
-            <a:r>
-              <a:rPr lang="en-US" b="1" dirty="0">
-                <a:latin typeface="Arial" panose="020B0604020202020204" pitchFamily="34" charset="0"/>
-                <a:cs typeface="Arial" panose="020B0604020202020204" pitchFamily="34" charset="0"/>
-              </a:rPr>
-              <a:t>Home</a:t>
-            </a:r>
-            <a:r>
-              <a:rPr lang="en-US" dirty="0">
-                <a:latin typeface="Arial" panose="020B0604020202020204" pitchFamily="34" charset="0"/>
-                <a:cs typeface="Arial" panose="020B0604020202020204" pitchFamily="34" charset="0"/>
-              </a:rPr>
-              <a:t> tab, select </a:t>
-            </a:r>
-            <a:r>
-              <a:rPr lang="en-US" b="1" dirty="0">
-                <a:latin typeface="Arial" panose="020B0604020202020204" pitchFamily="34" charset="0"/>
-                <a:cs typeface="Arial" panose="020B0604020202020204" pitchFamily="34" charset="0"/>
-              </a:rPr>
-              <a:t>Arrange</a:t>
-            </a:r>
-            <a:r>
-              <a:rPr lang="en-US" dirty="0">
-                <a:latin typeface="Arial" panose="020B0604020202020204" pitchFamily="34" charset="0"/>
-                <a:cs typeface="Arial" panose="020B0604020202020204" pitchFamily="34" charset="0"/>
-              </a:rPr>
-              <a:t> &gt; </a:t>
-            </a:r>
-            <a:br>
-              <a:rPr lang="en-US" dirty="0">
-                <a:latin typeface="Arial" panose="020B0604020202020204" pitchFamily="34" charset="0"/>
-                <a:cs typeface="Arial" panose="020B0604020202020204" pitchFamily="34" charset="0"/>
-              </a:rPr>
-            </a:br>
-            <a:r>
-              <a:rPr lang="en-US" b="1" dirty="0">
-                <a:latin typeface="Arial" panose="020B0604020202020204" pitchFamily="34" charset="0"/>
-                <a:cs typeface="Arial" panose="020B0604020202020204" pitchFamily="34" charset="0"/>
-              </a:rPr>
-              <a:t>Selection Pane</a:t>
-            </a:r>
-            <a:r>
-              <a:rPr lang="en-US" dirty="0">
-                <a:latin typeface="Arial" panose="020B0604020202020204" pitchFamily="34" charset="0"/>
-                <a:cs typeface="Arial" panose="020B0604020202020204" pitchFamily="34" charset="0"/>
-              </a:rPr>
-              <a:t>.</a:t>
-            </a:r>
-          </a:p>
-          <a:p>
-            <a:pPr marL="342900" indent="-342900">
-              <a:buFont typeface="+mj-lt"/>
-              <a:buAutoNum type="arabicPeriod"/>
-            </a:pPr>
-            <a:r>
-              <a:rPr lang="en-US" dirty="0">
-                <a:latin typeface="Arial" panose="020B0604020202020204" pitchFamily="34" charset="0"/>
-                <a:cs typeface="Arial" panose="020B0604020202020204" pitchFamily="34" charset="0"/>
-              </a:rPr>
-              <a:t>Try renaming an object: Double-click the</a:t>
-            </a:r>
-            <a:br>
-              <a:rPr lang="en-US" dirty="0">
-                <a:latin typeface="Arial" panose="020B0604020202020204" pitchFamily="34" charset="0"/>
-                <a:cs typeface="Arial" panose="020B0604020202020204" pitchFamily="34" charset="0"/>
-              </a:rPr>
-            </a:br>
-            <a:r>
-              <a:rPr lang="en-US" dirty="0">
-                <a:latin typeface="Arial" panose="020B0604020202020204" pitchFamily="34" charset="0"/>
-                <a:cs typeface="Arial" panose="020B0604020202020204" pitchFamily="34" charset="0"/>
-              </a:rPr>
-              <a:t>name “</a:t>
-            </a:r>
-            <a:r>
-              <a:rPr lang="en-US" dirty="0"/>
-              <a:t>Large grey rectangle</a:t>
-            </a:r>
-            <a:r>
-              <a:rPr lang="en-US" dirty="0">
-                <a:latin typeface="Arial" panose="020B0604020202020204" pitchFamily="34" charset="0"/>
-                <a:cs typeface="Arial" panose="020B0604020202020204" pitchFamily="34" charset="0"/>
-              </a:rPr>
-              <a:t>” in the </a:t>
-            </a:r>
-            <a:br>
-              <a:rPr lang="en-US" dirty="0">
-                <a:latin typeface="Arial" panose="020B0604020202020204" pitchFamily="34" charset="0"/>
-                <a:cs typeface="Arial" panose="020B0604020202020204" pitchFamily="34" charset="0"/>
-              </a:rPr>
-            </a:br>
-            <a:r>
-              <a:rPr lang="en-US" b="1" dirty="0">
-                <a:latin typeface="Arial" panose="020B0604020202020204" pitchFamily="34" charset="0"/>
-                <a:cs typeface="Arial" panose="020B0604020202020204" pitchFamily="34" charset="0"/>
-              </a:rPr>
-              <a:t>Selection Pane</a:t>
-            </a:r>
-            <a:r>
-              <a:rPr lang="en-US" dirty="0">
-                <a:latin typeface="Arial" panose="020B0604020202020204" pitchFamily="34" charset="0"/>
-                <a:cs typeface="Arial" panose="020B0604020202020204" pitchFamily="34" charset="0"/>
-              </a:rPr>
-              <a:t> and type a new name.</a:t>
-            </a:r>
-          </a:p>
-          <a:p>
-            <a:pPr marL="342900" indent="-342900">
-              <a:buFont typeface="+mj-lt"/>
-              <a:buAutoNum type="arabicPeriod"/>
-            </a:pPr>
-            <a:r>
-              <a:rPr lang="en-US" dirty="0">
-                <a:latin typeface="Arial" panose="020B0604020202020204" pitchFamily="34" charset="0"/>
-                <a:cs typeface="Arial" panose="020B0604020202020204" pitchFamily="34" charset="0"/>
-              </a:rPr>
-              <a:t>Try changing the order of objects: In the</a:t>
-            </a:r>
-            <a:br>
-              <a:rPr lang="en-US" dirty="0">
-                <a:latin typeface="Arial" panose="020B0604020202020204" pitchFamily="34" charset="0"/>
-                <a:cs typeface="Arial" panose="020B0604020202020204" pitchFamily="34" charset="0"/>
-              </a:rPr>
-            </a:br>
-            <a:r>
-              <a:rPr lang="en-US" b="1" dirty="0">
-                <a:latin typeface="Arial" panose="020B0604020202020204" pitchFamily="34" charset="0"/>
-                <a:cs typeface="Arial" panose="020B0604020202020204" pitchFamily="34" charset="0"/>
-              </a:rPr>
-              <a:t>Selection Pane</a:t>
-            </a:r>
-            <a:r>
-              <a:rPr lang="en-US" dirty="0">
-                <a:latin typeface="Arial" panose="020B0604020202020204" pitchFamily="34" charset="0"/>
-                <a:cs typeface="Arial" panose="020B0604020202020204" pitchFamily="34" charset="0"/>
-              </a:rPr>
-              <a:t>, drag and drop the large</a:t>
-            </a:r>
-            <a:br>
-              <a:rPr lang="en-US" dirty="0">
-                <a:latin typeface="Arial" panose="020B0604020202020204" pitchFamily="34" charset="0"/>
-                <a:cs typeface="Arial" panose="020B0604020202020204" pitchFamily="34" charset="0"/>
-              </a:rPr>
-            </a:br>
-            <a:r>
-              <a:rPr lang="en-US" dirty="0">
-                <a:latin typeface="Arial" panose="020B0604020202020204" pitchFamily="34" charset="0"/>
-                <a:cs typeface="Arial" panose="020B0604020202020204" pitchFamily="34" charset="0"/>
-              </a:rPr>
-              <a:t>grey rectangle so it’s at the top.</a:t>
-            </a:r>
-          </a:p>
-          <a:p>
-            <a:pPr marL="342900" indent="-342900">
-              <a:buFont typeface="+mj-lt"/>
-              <a:buAutoNum type="arabicPeriod"/>
-            </a:pPr>
-            <a:r>
-              <a:rPr lang="en-US" dirty="0">
-                <a:latin typeface="Arial" panose="020B0604020202020204" pitchFamily="34" charset="0"/>
-                <a:cs typeface="Arial" panose="020B0604020202020204" pitchFamily="34" charset="0"/>
-              </a:rPr>
-              <a:t>To toggle visibility of objects in the</a:t>
-            </a:r>
-            <a:br>
-              <a:rPr lang="en-US" dirty="0">
-                <a:latin typeface="Arial" panose="020B0604020202020204" pitchFamily="34" charset="0"/>
-                <a:cs typeface="Arial" panose="020B0604020202020204" pitchFamily="34" charset="0"/>
-              </a:rPr>
-            </a:br>
-            <a:r>
-              <a:rPr lang="en-US" b="1" dirty="0">
-                <a:latin typeface="Arial" panose="020B0604020202020204" pitchFamily="34" charset="0"/>
-                <a:cs typeface="Arial" panose="020B0604020202020204" pitchFamily="34" charset="0"/>
-              </a:rPr>
-              <a:t>Selection Pane</a:t>
-            </a:r>
-            <a:r>
-              <a:rPr lang="en-US" dirty="0">
-                <a:latin typeface="Arial" panose="020B0604020202020204" pitchFamily="34" charset="0"/>
-                <a:cs typeface="Arial" panose="020B0604020202020204" pitchFamily="34" charset="0"/>
-              </a:rPr>
-              <a:t>, click Show/Hide checkbox.</a:t>
-            </a:r>
-          </a:p>
-        </p:txBody>
-      </p:sp>
       <p:pic>
         <p:nvPicPr>
-          <p:cNvPr id="9" name="Picture 8" descr="Selection Pane"/>
+          <p:cNvPr id="11" name="Picture 10">
+            <a:extLst>
+              <a:ext uri="{FF2B5EF4-FFF2-40B4-BE49-F238E27FC236}">
+                <a16:creationId xmlns:a16="http://schemas.microsoft.com/office/drawing/2014/main" id="{888B2A9F-D16A-82EE-C31D-49E4C19F7DAD}"/>
+              </a:ext>
+            </a:extLst>
+          </p:cNvPr>
           <p:cNvPicPr>
             <a:picLocks noChangeAspect="1"/>
           </p:cNvPicPr>
@@ -3673,138 +3413,14 @@
         </p:blipFill>
         <p:spPr>
           <a:xfrm>
-            <a:off x="4913851" y="2742223"/>
-            <a:ext cx="3287123" cy="2984998"/>
+            <a:off x="721316" y="1399338"/>
+            <a:ext cx="10749367" cy="5458662"/>
           </a:xfrm>
           <a:prstGeom prst="rect">
             <a:avLst/>
           </a:prstGeom>
         </p:spPr>
       </p:pic>
-      <p:pic>
-        <p:nvPicPr>
-          <p:cNvPr id="10" name="Picture 9" descr="Show/Hide checkbox in the selection pane to toggle visibility"/>
-          <p:cNvPicPr>
-            <a:picLocks noChangeAspect="1"/>
-          </p:cNvPicPr>
-          <p:nvPr/>
-        </p:nvPicPr>
-        <p:blipFill>
-          <a:blip r:embed="rId4">
-            <a:extLst>
-              <a:ext uri="{28A0092B-C50C-407E-A947-70E740481C1C}">
-                <a14:useLocalDpi xmlns:a14="http://schemas.microsoft.com/office/drawing/2010/main" val="0"/>
-              </a:ext>
-            </a:extLst>
-          </a:blip>
-          <a:stretch>
-            <a:fillRect/>
-          </a:stretch>
-        </p:blipFill>
-        <p:spPr>
-          <a:xfrm>
-            <a:off x="5083578" y="5947471"/>
-            <a:ext cx="543336" cy="359872"/>
-          </a:xfrm>
-          <a:prstGeom prst="rect">
-            <a:avLst/>
-          </a:prstGeom>
-        </p:spPr>
-      </p:pic>
-      <p:sp>
-        <p:nvSpPr>
-          <p:cNvPr id="6" name="Large grey rectangle" descr="Large gray rectangle"/>
-          <p:cNvSpPr/>
-          <p:nvPr/>
-        </p:nvSpPr>
-        <p:spPr>
-          <a:xfrm>
-            <a:off x="8971719" y="1630837"/>
-            <a:ext cx="2959726" cy="4940755"/>
-          </a:xfrm>
-          <a:prstGeom prst="rect">
-            <a:avLst/>
-          </a:prstGeom>
-          <a:solidFill>
-            <a:srgbClr val="EBEBEB"/>
-          </a:solidFill>
-          <a:ln>
-            <a:noFill/>
-          </a:ln>
-        </p:spPr>
-        <p:style>
-          <a:lnRef idx="2">
-            <a:schemeClr val="accent1">
-              <a:shade val="50000"/>
-            </a:schemeClr>
-          </a:lnRef>
-          <a:fillRef idx="1">
-            <a:schemeClr val="accent1"/>
-          </a:fillRef>
-          <a:effectRef idx="0">
-            <a:schemeClr val="accent1"/>
-          </a:effectRef>
-          <a:fontRef idx="minor">
-            <a:schemeClr val="lt1"/>
-          </a:fontRef>
-        </p:style>
-        <p:txBody>
-          <a:bodyPr rtlCol="0" anchor="ctr"/>
-          <a:lstStyle/>
-          <a:p>
-            <a:pPr algn="ctr"/>
-            <a:endParaRPr lang="en-US" dirty="0"/>
-          </a:p>
-        </p:txBody>
-      </p:sp>
-      <p:sp>
-        <p:nvSpPr>
-          <p:cNvPr id="8" name="Small blue rectangle" descr="Small blue rectangle"/>
-          <p:cNvSpPr/>
-          <p:nvPr/>
-        </p:nvSpPr>
-        <p:spPr>
-          <a:xfrm>
-            <a:off x="9281160" y="2836135"/>
-            <a:ext cx="2332740" cy="2530158"/>
-          </a:xfrm>
-          <a:prstGeom prst="rect">
-            <a:avLst/>
-          </a:prstGeom>
-          <a:solidFill>
-            <a:schemeClr val="accent1">
-              <a:lumMod val="75000"/>
-            </a:schemeClr>
-          </a:solidFill>
-          <a:ln>
-            <a:noFill/>
-          </a:ln>
-        </p:spPr>
-        <p:style>
-          <a:lnRef idx="2">
-            <a:schemeClr val="accent1">
-              <a:shade val="50000"/>
-            </a:schemeClr>
-          </a:lnRef>
-          <a:fillRef idx="1">
-            <a:schemeClr val="accent1"/>
-          </a:fillRef>
-          <a:effectRef idx="0">
-            <a:schemeClr val="accent1"/>
-          </a:effectRef>
-          <a:fontRef idx="minor">
-            <a:schemeClr val="lt1"/>
-          </a:fontRef>
-        </p:style>
-        <p:txBody>
-          <a:bodyPr rtlCol="0" anchor="ctr"/>
-          <a:lstStyle/>
-          <a:p>
-            <a:pPr algn="ctr"/>
-            <a:endParaRPr lang="en-US" dirty="0"/>
-          </a:p>
-        </p:txBody>
-      </p:sp>
     </p:spTree>
     <p:extLst>
       <p:ext uri="{BB962C8B-B14F-4D97-AF65-F5344CB8AC3E}">
@@ -3857,552 +3473,6 @@
           </a:p>
         </p:txBody>
       </p:sp>
-      <p:sp>
-        <p:nvSpPr>
-          <p:cNvPr id="7" name="Text Instruction 1"/>
-          <p:cNvSpPr txBox="1">
-            <a:spLocks/>
-          </p:cNvSpPr>
-          <p:nvPr/>
-        </p:nvSpPr>
-        <p:spPr>
-          <a:xfrm>
-            <a:off x="823998" y="2669297"/>
-            <a:ext cx="4682996" cy="494169"/>
-          </a:xfrm>
-          <a:prstGeom prst="rect">
-            <a:avLst/>
-          </a:prstGeom>
-        </p:spPr>
-        <p:txBody>
-          <a:bodyPr vert="horz" lIns="91440" tIns="45720" rIns="91440" bIns="45720" rtlCol="0">
-            <a:normAutofit/>
-          </a:bodyPr>
-          <a:lstStyle>
-            <a:lvl1pPr marL="228600" indent="-228600" algn="l" defTabSz="914400" rtl="0" eaLnBrk="1" latinLnBrk="0" hangingPunct="1">
-              <a:lnSpc>
-                <a:spcPts val="1800"/>
-              </a:lnSpc>
-              <a:spcBef>
-                <a:spcPts val="1000"/>
-              </a:spcBef>
-              <a:spcAft>
-                <a:spcPts val="1000"/>
-              </a:spcAft>
-              <a:buFont typeface="Arial" panose="020B0604020202020204" pitchFamily="34" charset="0"/>
-              <a:buChar char="•"/>
-              <a:defRPr lang="en-US" sz="2400" kern="1200" baseline="0" smtClean="0">
-                <a:solidFill>
-                  <a:schemeClr val="tx1">
-                    <a:lumMod val="65000"/>
-                    <a:lumOff val="35000"/>
-                  </a:schemeClr>
-                </a:solidFill>
-                <a:latin typeface="+mj-lt"/>
-                <a:ea typeface="+mn-ea"/>
-                <a:cs typeface="+mn-cs"/>
-              </a:defRPr>
-            </a:lvl1pPr>
-            <a:lvl2pPr marL="685800" indent="-228600" algn="l" defTabSz="914400" rtl="0" eaLnBrk="1" latinLnBrk="0" hangingPunct="1">
-              <a:lnSpc>
-                <a:spcPts val="1800"/>
-              </a:lnSpc>
-              <a:spcBef>
-                <a:spcPts val="1000"/>
-              </a:spcBef>
-              <a:spcAft>
-                <a:spcPts val="1000"/>
-              </a:spcAft>
-              <a:buFont typeface="Arial" panose="020B0604020202020204" pitchFamily="34" charset="0"/>
-              <a:buChar char="•"/>
-              <a:defRPr lang="en-US" sz="1200" kern="1200" smtClean="0">
-                <a:solidFill>
-                  <a:schemeClr val="tx1">
-                    <a:lumMod val="75000"/>
-                    <a:lumOff val="25000"/>
-                  </a:schemeClr>
-                </a:solidFill>
-                <a:latin typeface="+mn-lt"/>
-                <a:ea typeface="+mn-ea"/>
-                <a:cs typeface="+mn-cs"/>
-              </a:defRPr>
-            </a:lvl2pPr>
-            <a:lvl3pPr marL="1143000" indent="-228600" algn="l" defTabSz="914400" rtl="0" eaLnBrk="1" latinLnBrk="0" hangingPunct="1">
-              <a:lnSpc>
-                <a:spcPts val="1800"/>
-              </a:lnSpc>
-              <a:spcBef>
-                <a:spcPts val="1000"/>
-              </a:spcBef>
-              <a:spcAft>
-                <a:spcPts val="1000"/>
-              </a:spcAft>
-              <a:buFont typeface="Arial" panose="020B0604020202020204" pitchFamily="34" charset="0"/>
-              <a:buChar char="•"/>
-              <a:defRPr lang="en-US" sz="1200" kern="1200" smtClean="0">
-                <a:solidFill>
-                  <a:schemeClr val="tx1">
-                    <a:lumMod val="75000"/>
-                    <a:lumOff val="25000"/>
-                  </a:schemeClr>
-                </a:solidFill>
-                <a:latin typeface="+mn-lt"/>
-                <a:ea typeface="+mn-ea"/>
-                <a:cs typeface="+mn-cs"/>
-              </a:defRPr>
-            </a:lvl3pPr>
-            <a:lvl4pPr marL="1600200" indent="-228600" algn="l" defTabSz="914400" rtl="0" eaLnBrk="1" latinLnBrk="0" hangingPunct="1">
-              <a:lnSpc>
-                <a:spcPts val="1800"/>
-              </a:lnSpc>
-              <a:spcBef>
-                <a:spcPts val="1000"/>
-              </a:spcBef>
-              <a:spcAft>
-                <a:spcPts val="1000"/>
-              </a:spcAft>
-              <a:buFont typeface="Arial" panose="020B0604020202020204" pitchFamily="34" charset="0"/>
-              <a:buChar char="•"/>
-              <a:defRPr lang="en-US" sz="1200" kern="1200" smtClean="0">
-                <a:solidFill>
-                  <a:schemeClr val="tx1">
-                    <a:lumMod val="75000"/>
-                    <a:lumOff val="25000"/>
-                  </a:schemeClr>
-                </a:solidFill>
-                <a:latin typeface="+mn-lt"/>
-                <a:ea typeface="+mn-ea"/>
-                <a:cs typeface="+mn-cs"/>
-              </a:defRPr>
-            </a:lvl4pPr>
-            <a:lvl5pPr marL="2057400" indent="-228600" algn="l" defTabSz="914400" rtl="0" eaLnBrk="1" latinLnBrk="0" hangingPunct="1">
-              <a:lnSpc>
-                <a:spcPts val="1800"/>
-              </a:lnSpc>
-              <a:spcBef>
-                <a:spcPts val="1000"/>
-              </a:spcBef>
-              <a:spcAft>
-                <a:spcPts val="1000"/>
-              </a:spcAft>
-              <a:buFont typeface="Arial" panose="020B0604020202020204" pitchFamily="34" charset="0"/>
-              <a:buChar char="•"/>
-              <a:defRPr lang="en-US" sz="1200" kern="1200">
-                <a:solidFill>
-                  <a:schemeClr val="tx1">
-                    <a:lumMod val="75000"/>
-                    <a:lumOff val="25000"/>
-                  </a:schemeClr>
-                </a:solidFill>
-                <a:latin typeface="+mn-lt"/>
-                <a:ea typeface="+mn-ea"/>
-                <a:cs typeface="+mn-cs"/>
-              </a:defRPr>
-            </a:lvl5pPr>
-            <a:lvl6pPr marL="2514600" indent="-228600" algn="l" defTabSz="914400" rtl="0" eaLnBrk="1" latinLnBrk="0" hangingPunct="1">
-              <a:lnSpc>
-                <a:spcPct val="90000"/>
-              </a:lnSpc>
-              <a:spcBef>
-                <a:spcPct val="30000"/>
-              </a:spcBef>
-              <a:buFont typeface="Arial" panose="020B0604020202020204" pitchFamily="34" charset="0"/>
-              <a:buChar char="•"/>
-              <a:defRPr sz="1800" kern="1200">
-                <a:solidFill>
-                  <a:schemeClr val="tx1"/>
-                </a:solidFill>
-                <a:latin typeface="+mn-lt"/>
-                <a:ea typeface="+mn-ea"/>
-                <a:cs typeface="+mn-cs"/>
-              </a:defRPr>
-            </a:lvl6pPr>
-            <a:lvl7pPr marL="2971800" indent="-228600" algn="l" defTabSz="914400" rtl="0" eaLnBrk="1" latinLnBrk="0" hangingPunct="1">
-              <a:lnSpc>
-                <a:spcPct val="90000"/>
-              </a:lnSpc>
-              <a:spcBef>
-                <a:spcPct val="30000"/>
-              </a:spcBef>
-              <a:buFont typeface="Arial" panose="020B0604020202020204" pitchFamily="34" charset="0"/>
-              <a:buChar char="•"/>
-              <a:defRPr sz="1800" kern="1200">
-                <a:solidFill>
-                  <a:schemeClr val="tx1"/>
-                </a:solidFill>
-                <a:latin typeface="+mn-lt"/>
-                <a:ea typeface="+mn-ea"/>
-                <a:cs typeface="+mn-cs"/>
-              </a:defRPr>
-            </a:lvl7pPr>
-            <a:lvl8pPr marL="3429000" indent="-228600" algn="l" defTabSz="914400" rtl="0" eaLnBrk="1" latinLnBrk="0" hangingPunct="1">
-              <a:lnSpc>
-                <a:spcPct val="90000"/>
-              </a:lnSpc>
-              <a:spcBef>
-                <a:spcPct val="30000"/>
-              </a:spcBef>
-              <a:buFont typeface="Arial" panose="020B0604020202020204" pitchFamily="34" charset="0"/>
-              <a:buChar char="•"/>
-              <a:defRPr sz="1800" kern="1200">
-                <a:solidFill>
-                  <a:schemeClr val="tx1"/>
-                </a:solidFill>
-                <a:latin typeface="+mn-lt"/>
-                <a:ea typeface="+mn-ea"/>
-                <a:cs typeface="+mn-cs"/>
-              </a:defRPr>
-            </a:lvl8pPr>
-            <a:lvl9pPr marL="3886200" indent="-228600" algn="l" defTabSz="914400" rtl="0" eaLnBrk="1" latinLnBrk="0" hangingPunct="1">
-              <a:lnSpc>
-                <a:spcPct val="90000"/>
-              </a:lnSpc>
-              <a:spcBef>
-                <a:spcPct val="30000"/>
-              </a:spcBef>
-              <a:buFont typeface="Arial" panose="020B0604020202020204" pitchFamily="34" charset="0"/>
-              <a:buChar char="•"/>
-              <a:defRPr sz="1800" kern="1200">
-                <a:solidFill>
-                  <a:schemeClr val="tx1"/>
-                </a:solidFill>
-                <a:latin typeface="+mn-lt"/>
-                <a:ea typeface="+mn-ea"/>
-                <a:cs typeface="+mn-cs"/>
-              </a:defRPr>
-            </a:lvl9pPr>
-          </a:lstStyle>
-          <a:p>
-            <a:pPr marL="0" indent="0">
-              <a:lnSpc>
-                <a:spcPct val="150000"/>
-              </a:lnSpc>
-              <a:buFont typeface="Arial" panose="020B0604020202020204" pitchFamily="34" charset="0"/>
-              <a:buNone/>
-            </a:pPr>
-            <a:r>
-              <a:rPr lang="en-US" sz="1200" dirty="0">
-                <a:latin typeface="Arial" panose="020B0604020202020204" pitchFamily="34" charset="0"/>
-                <a:cs typeface="Arial" panose="020B0604020202020204" pitchFamily="34" charset="0"/>
-              </a:rPr>
-              <a:t>SELECT THE ARROW WHEN IN SLIDE SHOW MODE</a:t>
-            </a:r>
-          </a:p>
-        </p:txBody>
-      </p:sp>
-      <p:sp>
-        <p:nvSpPr>
-          <p:cNvPr id="8" name="Content Placeholder 4"/>
-          <p:cNvSpPr txBox="1">
-            <a:spLocks/>
-          </p:cNvSpPr>
-          <p:nvPr/>
-        </p:nvSpPr>
-        <p:spPr>
-          <a:xfrm>
-            <a:off x="823998" y="3195102"/>
-            <a:ext cx="9796189" cy="1340627"/>
-          </a:xfrm>
-          <a:prstGeom prst="rect">
-            <a:avLst/>
-          </a:prstGeom>
-        </p:spPr>
-        <p:txBody>
-          <a:bodyPr vert="horz" lIns="91440" tIns="45720" rIns="91440" bIns="45720" rtlCol="0">
-            <a:normAutofit/>
-          </a:bodyPr>
-          <a:lstStyle>
-            <a:lvl1pPr marL="228600" indent="-228600" algn="l" defTabSz="914400" rtl="0" eaLnBrk="1" latinLnBrk="0" hangingPunct="1">
-              <a:lnSpc>
-                <a:spcPts val="1800"/>
-              </a:lnSpc>
-              <a:spcBef>
-                <a:spcPts val="1000"/>
-              </a:spcBef>
-              <a:spcAft>
-                <a:spcPts val="1000"/>
-              </a:spcAft>
-              <a:buFont typeface="Arial" panose="020B0604020202020204" pitchFamily="34" charset="0"/>
-              <a:buChar char="•"/>
-              <a:defRPr lang="en-US" sz="2400" kern="1200" baseline="0" smtClean="0">
-                <a:solidFill>
-                  <a:schemeClr val="tx1">
-                    <a:lumMod val="65000"/>
-                    <a:lumOff val="35000"/>
-                  </a:schemeClr>
-                </a:solidFill>
-                <a:latin typeface="+mj-lt"/>
-                <a:ea typeface="+mn-ea"/>
-                <a:cs typeface="+mn-cs"/>
-              </a:defRPr>
-            </a:lvl1pPr>
-            <a:lvl2pPr marL="685800" indent="-228600" algn="l" defTabSz="914400" rtl="0" eaLnBrk="1" latinLnBrk="0" hangingPunct="1">
-              <a:lnSpc>
-                <a:spcPts val="1800"/>
-              </a:lnSpc>
-              <a:spcBef>
-                <a:spcPts val="1000"/>
-              </a:spcBef>
-              <a:spcAft>
-                <a:spcPts val="1000"/>
-              </a:spcAft>
-              <a:buFont typeface="Arial" panose="020B0604020202020204" pitchFamily="34" charset="0"/>
-              <a:buChar char="•"/>
-              <a:defRPr lang="en-US" sz="1200" kern="1200" smtClean="0">
-                <a:solidFill>
-                  <a:schemeClr val="tx1">
-                    <a:lumMod val="75000"/>
-                    <a:lumOff val="25000"/>
-                  </a:schemeClr>
-                </a:solidFill>
-                <a:latin typeface="+mn-lt"/>
-                <a:ea typeface="+mn-ea"/>
-                <a:cs typeface="+mn-cs"/>
-              </a:defRPr>
-            </a:lvl2pPr>
-            <a:lvl3pPr marL="1143000" indent="-228600" algn="l" defTabSz="914400" rtl="0" eaLnBrk="1" latinLnBrk="0" hangingPunct="1">
-              <a:lnSpc>
-                <a:spcPts val="1800"/>
-              </a:lnSpc>
-              <a:spcBef>
-                <a:spcPts val="1000"/>
-              </a:spcBef>
-              <a:spcAft>
-                <a:spcPts val="1000"/>
-              </a:spcAft>
-              <a:buFont typeface="Arial" panose="020B0604020202020204" pitchFamily="34" charset="0"/>
-              <a:buChar char="•"/>
-              <a:defRPr lang="en-US" sz="1200" kern="1200" smtClean="0">
-                <a:solidFill>
-                  <a:schemeClr val="tx1">
-                    <a:lumMod val="75000"/>
-                    <a:lumOff val="25000"/>
-                  </a:schemeClr>
-                </a:solidFill>
-                <a:latin typeface="+mn-lt"/>
-                <a:ea typeface="+mn-ea"/>
-                <a:cs typeface="+mn-cs"/>
-              </a:defRPr>
-            </a:lvl3pPr>
-            <a:lvl4pPr marL="1600200" indent="-228600" algn="l" defTabSz="914400" rtl="0" eaLnBrk="1" latinLnBrk="0" hangingPunct="1">
-              <a:lnSpc>
-                <a:spcPts val="1800"/>
-              </a:lnSpc>
-              <a:spcBef>
-                <a:spcPts val="1000"/>
-              </a:spcBef>
-              <a:spcAft>
-                <a:spcPts val="1000"/>
-              </a:spcAft>
-              <a:buFont typeface="Arial" panose="020B0604020202020204" pitchFamily="34" charset="0"/>
-              <a:buChar char="•"/>
-              <a:defRPr lang="en-US" sz="1200" kern="1200" smtClean="0">
-                <a:solidFill>
-                  <a:schemeClr val="tx1">
-                    <a:lumMod val="75000"/>
-                    <a:lumOff val="25000"/>
-                  </a:schemeClr>
-                </a:solidFill>
-                <a:latin typeface="+mn-lt"/>
-                <a:ea typeface="+mn-ea"/>
-                <a:cs typeface="+mn-cs"/>
-              </a:defRPr>
-            </a:lvl4pPr>
-            <a:lvl5pPr marL="2057400" indent="-228600" algn="l" defTabSz="914400" rtl="0" eaLnBrk="1" latinLnBrk="0" hangingPunct="1">
-              <a:lnSpc>
-                <a:spcPts val="1800"/>
-              </a:lnSpc>
-              <a:spcBef>
-                <a:spcPts val="1000"/>
-              </a:spcBef>
-              <a:spcAft>
-                <a:spcPts val="1000"/>
-              </a:spcAft>
-              <a:buFont typeface="Arial" panose="020B0604020202020204" pitchFamily="34" charset="0"/>
-              <a:buChar char="•"/>
-              <a:defRPr lang="en-US" sz="1200" kern="1200">
-                <a:solidFill>
-                  <a:schemeClr val="tx1">
-                    <a:lumMod val="75000"/>
-                    <a:lumOff val="25000"/>
-                  </a:schemeClr>
-                </a:solidFill>
-                <a:latin typeface="+mn-lt"/>
-                <a:ea typeface="+mn-ea"/>
-                <a:cs typeface="+mn-cs"/>
-              </a:defRPr>
-            </a:lvl5pPr>
-            <a:lvl6pPr marL="2514600" indent="-228600" algn="l" defTabSz="914400" rtl="0" eaLnBrk="1" latinLnBrk="0" hangingPunct="1">
-              <a:lnSpc>
-                <a:spcPct val="90000"/>
-              </a:lnSpc>
-              <a:spcBef>
-                <a:spcPct val="30000"/>
-              </a:spcBef>
-              <a:buFont typeface="Arial" panose="020B0604020202020204" pitchFamily="34" charset="0"/>
-              <a:buChar char="•"/>
-              <a:defRPr sz="1800" kern="1200">
-                <a:solidFill>
-                  <a:schemeClr val="tx1"/>
-                </a:solidFill>
-                <a:latin typeface="+mn-lt"/>
-                <a:ea typeface="+mn-ea"/>
-                <a:cs typeface="+mn-cs"/>
-              </a:defRPr>
-            </a:lvl6pPr>
-            <a:lvl7pPr marL="2971800" indent="-228600" algn="l" defTabSz="914400" rtl="0" eaLnBrk="1" latinLnBrk="0" hangingPunct="1">
-              <a:lnSpc>
-                <a:spcPct val="90000"/>
-              </a:lnSpc>
-              <a:spcBef>
-                <a:spcPct val="30000"/>
-              </a:spcBef>
-              <a:buFont typeface="Arial" panose="020B0604020202020204" pitchFamily="34" charset="0"/>
-              <a:buChar char="•"/>
-              <a:defRPr sz="1800" kern="1200">
-                <a:solidFill>
-                  <a:schemeClr val="tx1"/>
-                </a:solidFill>
-                <a:latin typeface="+mn-lt"/>
-                <a:ea typeface="+mn-ea"/>
-                <a:cs typeface="+mn-cs"/>
-              </a:defRPr>
-            </a:lvl7pPr>
-            <a:lvl8pPr marL="3429000" indent="-228600" algn="l" defTabSz="914400" rtl="0" eaLnBrk="1" latinLnBrk="0" hangingPunct="1">
-              <a:lnSpc>
-                <a:spcPct val="90000"/>
-              </a:lnSpc>
-              <a:spcBef>
-                <a:spcPct val="30000"/>
-              </a:spcBef>
-              <a:buFont typeface="Arial" panose="020B0604020202020204" pitchFamily="34" charset="0"/>
-              <a:buChar char="•"/>
-              <a:defRPr sz="1800" kern="1200">
-                <a:solidFill>
-                  <a:schemeClr val="tx1"/>
-                </a:solidFill>
-                <a:latin typeface="+mn-lt"/>
-                <a:ea typeface="+mn-ea"/>
-                <a:cs typeface="+mn-cs"/>
-              </a:defRPr>
-            </a:lvl8pPr>
-            <a:lvl9pPr marL="3886200" indent="-228600" algn="l" defTabSz="914400" rtl="0" eaLnBrk="1" latinLnBrk="0" hangingPunct="1">
-              <a:lnSpc>
-                <a:spcPct val="90000"/>
-              </a:lnSpc>
-              <a:spcBef>
-                <a:spcPct val="30000"/>
-              </a:spcBef>
-              <a:buFont typeface="Arial" panose="020B0604020202020204" pitchFamily="34" charset="0"/>
-              <a:buChar char="•"/>
-              <a:defRPr sz="1800" kern="1200">
-                <a:solidFill>
-                  <a:schemeClr val="tx1"/>
-                </a:solidFill>
-                <a:latin typeface="+mn-lt"/>
-                <a:ea typeface="+mn-ea"/>
-                <a:cs typeface="+mn-cs"/>
-              </a:defRPr>
-            </a:lvl9pPr>
-          </a:lstStyle>
-          <a:p>
-            <a:pPr marL="0" indent="0">
-              <a:lnSpc>
-                <a:spcPts val="3600"/>
-              </a:lnSpc>
-              <a:buFont typeface="Arial" panose="020B0604020202020204" pitchFamily="34" charset="0"/>
-              <a:buNone/>
-            </a:pPr>
-            <a:r>
-              <a:rPr lang="en-US" sz="2000" dirty="0">
-                <a:latin typeface="Arial" panose="020B0604020202020204" pitchFamily="34" charset="0"/>
-                <a:cs typeface="Arial" panose="020B0604020202020204" pitchFamily="34" charset="0"/>
-              </a:rPr>
-              <a:t>Find out more at the PowerPoint for Mac Help Center.</a:t>
-            </a:r>
-          </a:p>
-          <a:p>
-            <a:pPr marL="0" indent="0">
-              <a:lnSpc>
-                <a:spcPct val="150000"/>
-              </a:lnSpc>
-              <a:buFont typeface="Arial" panose="020B0604020202020204" pitchFamily="34" charset="0"/>
-              <a:buNone/>
-            </a:pPr>
-            <a:r>
-              <a:rPr lang="en-US" sz="2000" dirty="0">
-                <a:latin typeface="Arial" panose="020B0604020202020204" pitchFamily="34" charset="0"/>
-                <a:cs typeface="Arial" panose="020B0604020202020204" pitchFamily="34" charset="0"/>
-              </a:rPr>
-              <a:t>Visit the PowerPoint team blog.</a:t>
-            </a:r>
-          </a:p>
-        </p:txBody>
-      </p:sp>
-      <p:pic>
-        <p:nvPicPr>
-          <p:cNvPr id="10" name="Hyperlinked Picture 9" descr="Arrow pointing right with a hyperlink to PowerPoint for Mac Help Center. Select the image to find out more at the PowerPoint for Mac Help Center">
-            <a:hlinkClick r:id="rId3" tooltip="Select here to find out more at the PowerPoint for Mac Help Center."/>
-          </p:cNvPr>
-          <p:cNvPicPr>
-            <a:picLocks noChangeAspect="1"/>
-          </p:cNvPicPr>
-          <p:nvPr/>
-        </p:nvPicPr>
-        <p:blipFill>
-          <a:blip r:embed="rId4" cstate="print">
-            <a:extLst>
-              <a:ext uri="{28A0092B-C50C-407E-A947-70E740481C1C}">
-                <a14:useLocalDpi xmlns:a14="http://schemas.microsoft.com/office/drawing/2010/main" val="0"/>
-              </a:ext>
-            </a:extLst>
-          </a:blip>
-          <a:stretch>
-            <a:fillRect/>
-          </a:stretch>
-        </p:blipFill>
-        <p:spPr>
-          <a:xfrm>
-            <a:off x="7114211" y="3154680"/>
-            <a:ext cx="661940" cy="661940"/>
-          </a:xfrm>
-          <a:prstGeom prst="rect">
-            <a:avLst/>
-          </a:prstGeom>
-        </p:spPr>
-      </p:pic>
-      <p:pic>
-        <p:nvPicPr>
-          <p:cNvPr id="3" name="Hyperlinked Picture 2" descr="Arrow pointing right with a hyperlink to the PowerPoint team blog. Select the image to visit the PowerPoint team blog ">
-            <a:hlinkClick r:id="rId5" tooltip="Select here to visit the PowerPoint team blog."/>
-          </p:cNvPr>
-          <p:cNvPicPr>
-            <a:picLocks noChangeAspect="1"/>
-          </p:cNvPicPr>
-          <p:nvPr/>
-        </p:nvPicPr>
-        <p:blipFill>
-          <a:blip r:embed="rId4" cstate="print">
-            <a:extLst>
-              <a:ext uri="{28A0092B-C50C-407E-A947-70E740481C1C}">
-                <a14:useLocalDpi xmlns:a14="http://schemas.microsoft.com/office/drawing/2010/main" val="0"/>
-              </a:ext>
-            </a:extLst>
-          </a:blip>
-          <a:stretch>
-            <a:fillRect/>
-          </a:stretch>
-        </p:blipFill>
-        <p:spPr>
-          <a:xfrm>
-            <a:off x="4645716" y="3873789"/>
-            <a:ext cx="661940" cy="661940"/>
-          </a:xfrm>
-          <a:prstGeom prst="rect">
-            <a:avLst/>
-          </a:prstGeom>
-        </p:spPr>
-      </p:pic>
     </p:spTree>
     <p:extLst>
       <p:ext uri="{BB962C8B-B14F-4D97-AF65-F5344CB8AC3E}">

</xml_diff>